<commit_message>
minor change to correct error in 04
</commit_message>
<xml_diff>
--- a/Introduction.pptx
+++ b/Introduction.pptx
@@ -129,7 +129,7 @@
   <pc:docChgLst>
     <pc:chgData name="Geoffrey Chambers" userId="60ce0cddda231f84" providerId="LiveId" clId="{09758DA6-C54C-43E7-BBCF-4258CF3C469B}"/>
     <pc:docChg chg="undo custSel modSld">
-      <pc:chgData name="Geoffrey Chambers" userId="60ce0cddda231f84" providerId="LiveId" clId="{09758DA6-C54C-43E7-BBCF-4258CF3C469B}" dt="2018-11-25T14:16:33.110" v="926" actId="20577"/>
+      <pc:chgData name="Geoffrey Chambers" userId="60ce0cddda231f84" providerId="LiveId" clId="{09758DA6-C54C-43E7-BBCF-4258CF3C469B}" dt="2018-11-25T14:18:58.022" v="927" actId="14100"/>
       <pc:docMkLst>
         <pc:docMk/>
       </pc:docMkLst>
@@ -229,6 +229,21 @@
           <ac:spMkLst>
             <pc:docMk/>
             <pc:sldMk cId="45027736" sldId="260"/>
+            <ac:spMk id="3" creationId="{00000000-0000-0000-0000-000000000000}"/>
+          </ac:spMkLst>
+        </pc:spChg>
+      </pc:sldChg>
+      <pc:sldChg chg="modSp">
+        <pc:chgData name="Geoffrey Chambers" userId="60ce0cddda231f84" providerId="LiveId" clId="{09758DA6-C54C-43E7-BBCF-4258CF3C469B}" dt="2018-11-25T14:18:58.022" v="927" actId="14100"/>
+        <pc:sldMkLst>
+          <pc:docMk/>
+          <pc:sldMk cId="1613877447" sldId="261"/>
+        </pc:sldMkLst>
+        <pc:spChg chg="mod">
+          <ac:chgData name="Geoffrey Chambers" userId="60ce0cddda231f84" providerId="LiveId" clId="{09758DA6-C54C-43E7-BBCF-4258CF3C469B}" dt="2018-11-25T14:18:58.022" v="927" actId="14100"/>
+          <ac:spMkLst>
+            <pc:docMk/>
+            <pc:sldMk cId="1613877447" sldId="261"/>
             <ac:spMk id="3" creationId="{00000000-0000-0000-0000-000000000000}"/>
           </ac:spMkLst>
         </pc:spChg>
@@ -6914,7 +6929,7 @@
         <p:spPr>
           <a:xfrm>
             <a:off x="591609" y="1270000"/>
-            <a:ext cx="8596668" cy="3880773"/>
+            <a:ext cx="8596668" cy="3437729"/>
           </a:xfrm>
         </p:spPr>
         <p:txBody>

</xml_diff>